<commit_message>
Updated slides for 7.5 & 11.11
</commit_message>
<xml_diff>
--- a/slides/Optimization_7.5_11.11.pptx
+++ b/slides/Optimization_7.5_11.11.pptx
@@ -127,6 +127,11 @@
       </a:defRPr>
     </a:lvl9pPr>
   </p:defaultTextStyle>
+  <p:extLst>
+    <p:ext uri="{EFAFB233-063F-42B5-8137-9DF3F51BA10A}">
+      <p15:sldGuideLst xmlns:p15="http://schemas.microsoft.com/office/powerpoint/2012/main"/>
+    </p:ext>
+  </p:extLst>
 </p:presentation>
 </file>
 
@@ -212,7 +217,7 @@
           <a:p>
             <a:fld id="{9620A966-6B48-0645-BA04-0DB819678936}" type="datetimeFigureOut">
               <a:rPr lang="en-US" smtClean="0"/>
-              <a:t>3/23/22</a:t>
+              <a:t>3/25/22</a:t>
             </a:fld>
             <a:endParaRPr lang="en-US"/>
           </a:p>
@@ -544,6 +549,90 @@
           <a:p>
             <a:fld id="{62A71A05-2014-C746-A889-69A8B7705EBB}" type="slidenum">
               <a:rPr lang="en-US" smtClean="0"/>
+              <a:t>7</a:t>
+            </a:fld>
+            <a:endParaRPr lang="en-US"/>
+          </a:p>
+        </p:txBody>
+      </p:sp>
+    </p:spTree>
+    <p:extLst>
+      <p:ext uri="{BB962C8B-B14F-4D97-AF65-F5344CB8AC3E}">
+        <p14:creationId xmlns:p14="http://schemas.microsoft.com/office/powerpoint/2010/main" val="3381812687"/>
+      </p:ext>
+    </p:extLst>
+  </p:cSld>
+  <p:clrMapOvr>
+    <a:masterClrMapping/>
+  </p:clrMapOvr>
+</p:notes>
+</file>
+
+<file path=ppt/notesSlides/notesSlide2.xml><?xml version="1.0" encoding="utf-8"?>
+<p:notes xmlns:a="http://schemas.openxmlformats.org/drawingml/2006/main" xmlns:r="http://schemas.openxmlformats.org/officeDocument/2006/relationships" xmlns:p="http://schemas.openxmlformats.org/presentationml/2006/main">
+  <p:cSld>
+    <p:spTree>
+      <p:nvGrpSpPr>
+        <p:cNvPr id="1" name=""/>
+        <p:cNvGrpSpPr/>
+        <p:nvPr/>
+      </p:nvGrpSpPr>
+      <p:grpSpPr>
+        <a:xfrm>
+          <a:off x="0" y="0"/>
+          <a:ext cx="0" cy="0"/>
+          <a:chOff x="0" y="0"/>
+          <a:chExt cx="0" cy="0"/>
+        </a:xfrm>
+      </p:grpSpPr>
+      <p:sp>
+        <p:nvSpPr>
+          <p:cNvPr id="2" name="Slide Image Placeholder 1"/>
+          <p:cNvSpPr>
+            <a:spLocks noGrp="1" noRot="1" noChangeAspect="1"/>
+          </p:cNvSpPr>
+          <p:nvPr>
+            <p:ph type="sldImg"/>
+          </p:nvPr>
+        </p:nvSpPr>
+        <p:spPr/>
+      </p:sp>
+      <p:sp>
+        <p:nvSpPr>
+          <p:cNvPr id="3" name="Notes Placeholder 2"/>
+          <p:cNvSpPr>
+            <a:spLocks noGrp="1"/>
+          </p:cNvSpPr>
+          <p:nvPr>
+            <p:ph type="body" idx="1"/>
+          </p:nvPr>
+        </p:nvSpPr>
+        <p:spPr/>
+        <p:txBody>
+          <a:bodyPr/>
+          <a:lstStyle/>
+          <a:p>
+            <a:endParaRPr lang="en-US" dirty="0"/>
+          </a:p>
+        </p:txBody>
+      </p:sp>
+      <p:sp>
+        <p:nvSpPr>
+          <p:cNvPr id="4" name="Slide Number Placeholder 3"/>
+          <p:cNvSpPr>
+            <a:spLocks noGrp="1"/>
+          </p:cNvSpPr>
+          <p:nvPr>
+            <p:ph type="sldNum" sz="quarter" idx="5"/>
+          </p:nvPr>
+        </p:nvSpPr>
+        <p:spPr/>
+        <p:txBody>
+          <a:bodyPr/>
+          <a:lstStyle/>
+          <a:p>
+            <a:fld id="{62A71A05-2014-C746-A889-69A8B7705EBB}" type="slidenum">
+              <a:rPr lang="en-US" smtClean="0"/>
               <a:t>15</a:t>
             </a:fld>
             <a:endParaRPr lang="en-US"/>
@@ -710,7 +799,7 @@
           <a:p>
             <a:fld id="{951EA9A4-BC81-4C45-85A3-48B48646A4CC}" type="datetimeFigureOut">
               <a:rPr lang="en-US" smtClean="0"/>
-              <a:t>3/22/22</a:t>
+              <a:t>3/25/22</a:t>
             </a:fld>
             <a:endParaRPr lang="en-US"/>
           </a:p>
@@ -908,7 +997,7 @@
           <a:p>
             <a:fld id="{951EA9A4-BC81-4C45-85A3-48B48646A4CC}" type="datetimeFigureOut">
               <a:rPr lang="en-US" smtClean="0"/>
-              <a:t>3/22/22</a:t>
+              <a:t>3/25/22</a:t>
             </a:fld>
             <a:endParaRPr lang="en-US"/>
           </a:p>
@@ -1116,7 +1205,7 @@
           <a:p>
             <a:fld id="{951EA9A4-BC81-4C45-85A3-48B48646A4CC}" type="datetimeFigureOut">
               <a:rPr lang="en-US" smtClean="0"/>
-              <a:t>3/22/22</a:t>
+              <a:t>3/25/22</a:t>
             </a:fld>
             <a:endParaRPr lang="en-US"/>
           </a:p>
@@ -1314,7 +1403,7 @@
           <a:p>
             <a:fld id="{951EA9A4-BC81-4C45-85A3-48B48646A4CC}" type="datetimeFigureOut">
               <a:rPr lang="en-US" smtClean="0"/>
-              <a:t>3/22/22</a:t>
+              <a:t>3/25/22</a:t>
             </a:fld>
             <a:endParaRPr lang="en-US"/>
           </a:p>
@@ -1589,7 +1678,7 @@
           <a:p>
             <a:fld id="{951EA9A4-BC81-4C45-85A3-48B48646A4CC}" type="datetimeFigureOut">
               <a:rPr lang="en-US" smtClean="0"/>
-              <a:t>3/22/22</a:t>
+              <a:t>3/25/22</a:t>
             </a:fld>
             <a:endParaRPr lang="en-US"/>
           </a:p>
@@ -1854,7 +1943,7 @@
           <a:p>
             <a:fld id="{951EA9A4-BC81-4C45-85A3-48B48646A4CC}" type="datetimeFigureOut">
               <a:rPr lang="en-US" smtClean="0"/>
-              <a:t>3/22/22</a:t>
+              <a:t>3/25/22</a:t>
             </a:fld>
             <a:endParaRPr lang="en-US"/>
           </a:p>
@@ -2266,7 +2355,7 @@
           <a:p>
             <a:fld id="{951EA9A4-BC81-4C45-85A3-48B48646A4CC}" type="datetimeFigureOut">
               <a:rPr lang="en-US" smtClean="0"/>
-              <a:t>3/22/22</a:t>
+              <a:t>3/25/22</a:t>
             </a:fld>
             <a:endParaRPr lang="en-US"/>
           </a:p>
@@ -2407,7 +2496,7 @@
           <a:p>
             <a:fld id="{951EA9A4-BC81-4C45-85A3-48B48646A4CC}" type="datetimeFigureOut">
               <a:rPr lang="en-US" smtClean="0"/>
-              <a:t>3/22/22</a:t>
+              <a:t>3/25/22</a:t>
             </a:fld>
             <a:endParaRPr lang="en-US"/>
           </a:p>
@@ -2520,7 +2609,7 @@
           <a:p>
             <a:fld id="{951EA9A4-BC81-4C45-85A3-48B48646A4CC}" type="datetimeFigureOut">
               <a:rPr lang="en-US" smtClean="0"/>
-              <a:t>3/22/22</a:t>
+              <a:t>3/25/22</a:t>
             </a:fld>
             <a:endParaRPr lang="en-US"/>
           </a:p>
@@ -2831,7 +2920,7 @@
           <a:p>
             <a:fld id="{951EA9A4-BC81-4C45-85A3-48B48646A4CC}" type="datetimeFigureOut">
               <a:rPr lang="en-US" smtClean="0"/>
-              <a:t>3/22/22</a:t>
+              <a:t>3/25/22</a:t>
             </a:fld>
             <a:endParaRPr lang="en-US"/>
           </a:p>
@@ -3119,7 +3208,7 @@
           <a:p>
             <a:fld id="{951EA9A4-BC81-4C45-85A3-48B48646A4CC}" type="datetimeFigureOut">
               <a:rPr lang="en-US" smtClean="0"/>
-              <a:t>3/22/22</a:t>
+              <a:t>3/25/22</a:t>
             </a:fld>
             <a:endParaRPr lang="en-US"/>
           </a:p>
@@ -3360,7 +3449,7 @@
           <a:p>
             <a:fld id="{951EA9A4-BC81-4C45-85A3-48B48646A4CC}" type="datetimeFigureOut">
               <a:rPr lang="en-US" smtClean="0"/>
-              <a:t>3/22/22</a:t>
+              <a:t>3/25/22</a:t>
             </a:fld>
             <a:endParaRPr lang="en-US"/>
           </a:p>
@@ -4120,7 +4209,7 @@
         </p:blipFill>
         <p:spPr>
           <a:xfrm>
-            <a:off x="8114260" y="1164272"/>
+            <a:off x="8209428" y="928528"/>
             <a:ext cx="3422073" cy="2722783"/>
           </a:xfrm>
           <a:prstGeom prst="rect">
@@ -4149,7 +4238,7 @@
         </p:blipFill>
         <p:spPr>
           <a:xfrm>
-            <a:off x="8323001" y="3887055"/>
+            <a:off x="8413765" y="3702389"/>
             <a:ext cx="3422073" cy="2722783"/>
           </a:xfrm>
           <a:prstGeom prst="rect">
@@ -4157,6 +4246,49 @@
           </a:prstGeom>
         </p:spPr>
       </p:pic>
+      <p:sp>
+        <p:nvSpPr>
+          <p:cNvPr id="6" name="TextBox 5">
+            <a:extLst>
+              <a:ext uri="{FF2B5EF4-FFF2-40B4-BE49-F238E27FC236}">
+                <a16:creationId xmlns:a16="http://schemas.microsoft.com/office/drawing/2014/main" id="{545A384C-CE8B-BA4C-BD91-6BD9481A6E76}"/>
+              </a:ext>
+            </a:extLst>
+          </p:cNvPr>
+          <p:cNvSpPr txBox="1"/>
+          <p:nvPr/>
+        </p:nvSpPr>
+        <p:spPr>
+          <a:xfrm>
+            <a:off x="9223410" y="6476250"/>
+            <a:ext cx="3422073" cy="369332"/>
+          </a:xfrm>
+          <a:prstGeom prst="rect">
+            <a:avLst/>
+          </a:prstGeom>
+          <a:noFill/>
+        </p:spPr>
+        <p:txBody>
+          <a:bodyPr wrap="square" rtlCol="0">
+            <a:spAutoFit/>
+          </a:bodyPr>
+          <a:lstStyle/>
+          <a:p>
+            <a:r>
+              <a:rPr lang="en-US" dirty="0"/>
+              <a:t>Figure: </a:t>
+            </a:r>
+            <a:r>
+              <a:rPr lang="en-US" dirty="0" err="1"/>
+              <a:t>Santurkar</a:t>
+            </a:r>
+            <a:r>
+              <a:rPr lang="en-US" dirty="0"/>
+              <a:t> et al. (2018)</a:t>
+            </a:r>
+          </a:p>
+        </p:txBody>
+      </p:sp>
     </p:spTree>
     <p:extLst>
       <p:ext uri="{BB962C8B-B14F-4D97-AF65-F5344CB8AC3E}">
@@ -4758,6 +4890,49 @@
           </a:p>
         </p:txBody>
       </p:sp>
+      <p:sp>
+        <p:nvSpPr>
+          <p:cNvPr id="3" name="TextBox 2">
+            <a:extLst>
+              <a:ext uri="{FF2B5EF4-FFF2-40B4-BE49-F238E27FC236}">
+                <a16:creationId xmlns:a16="http://schemas.microsoft.com/office/drawing/2014/main" id="{076CFD38-1C9E-704B-87EE-A3E8DE2A9802}"/>
+              </a:ext>
+            </a:extLst>
+          </p:cNvPr>
+          <p:cNvSpPr txBox="1"/>
+          <p:nvPr/>
+        </p:nvSpPr>
+        <p:spPr>
+          <a:xfrm>
+            <a:off x="9251734" y="6288624"/>
+            <a:ext cx="3360234" cy="369332"/>
+          </a:xfrm>
+          <a:prstGeom prst="rect">
+            <a:avLst/>
+          </a:prstGeom>
+          <a:noFill/>
+        </p:spPr>
+        <p:txBody>
+          <a:bodyPr wrap="square" rtlCol="0">
+            <a:spAutoFit/>
+          </a:bodyPr>
+          <a:lstStyle/>
+          <a:p>
+            <a:r>
+              <a:rPr lang="en-US" dirty="0"/>
+              <a:t>Figure: </a:t>
+            </a:r>
+            <a:r>
+              <a:rPr lang="en-US" dirty="0" err="1"/>
+              <a:t>Konar</a:t>
+            </a:r>
+            <a:r>
+              <a:rPr lang="en-US" dirty="0"/>
+              <a:t> et al. (2020)</a:t>
+            </a:r>
+          </a:p>
+        </p:txBody>
+      </p:sp>
     </p:spTree>
     <p:extLst>
       <p:ext uri="{BB962C8B-B14F-4D97-AF65-F5344CB8AC3E}">
@@ -5923,6 +6098,51 @@
           </a:extLst>
         </p:spPr>
       </p:pic>
+      <p:sp>
+        <p:nvSpPr>
+          <p:cNvPr id="3" name="TextBox 2">
+            <a:extLst>
+              <a:ext uri="{FF2B5EF4-FFF2-40B4-BE49-F238E27FC236}">
+                <a16:creationId xmlns:a16="http://schemas.microsoft.com/office/drawing/2014/main" id="{D6396A7C-C9C9-1B4B-8897-50C852C6BDB7}"/>
+              </a:ext>
+            </a:extLst>
+          </p:cNvPr>
+          <p:cNvSpPr txBox="1"/>
+          <p:nvPr/>
+        </p:nvSpPr>
+        <p:spPr>
+          <a:xfrm>
+            <a:off x="0" y="6236191"/>
+            <a:ext cx="3661379" cy="800219"/>
+          </a:xfrm>
+          <a:prstGeom prst="rect">
+            <a:avLst/>
+          </a:prstGeom>
+          <a:noFill/>
+        </p:spPr>
+        <p:txBody>
+          <a:bodyPr wrap="square" rtlCol="0">
+            <a:spAutoFit/>
+          </a:bodyPr>
+          <a:lstStyle/>
+          <a:p>
+            <a:r>
+              <a:rPr lang="en-US" sz="1400" dirty="0"/>
+              <a:t>Middle plot: </a:t>
+            </a:r>
+            <a:r>
+              <a:rPr lang="en-US" sz="1400" dirty="0">
+                <a:hlinkClick r:id="rId6"/>
+              </a:rPr>
+              <a:t>https://neptune.ai/blog/how-to-choose-a-learning-rate-scheduler</a:t>
+            </a:r>
+            <a:endParaRPr lang="en-US" sz="1400" dirty="0"/>
+          </a:p>
+          <a:p>
+            <a:endParaRPr lang="en-US" dirty="0"/>
+          </a:p>
+        </p:txBody>
+      </p:sp>
     </p:spTree>
     <p:extLst>
       <p:ext uri="{BB962C8B-B14F-4D97-AF65-F5344CB8AC3E}">
@@ -6110,7 +6330,7 @@
         <p:spPr>
           <a:xfrm>
             <a:off x="6829425" y="1825624"/>
-            <a:ext cx="4524373" cy="3108543"/>
+            <a:ext cx="4524373" cy="3539430"/>
           </a:xfrm>
           <a:prstGeom prst="rect">
             <a:avLst/>
@@ -6142,7 +6362,7 @@
             </a:pPr>
             <a:r>
               <a:rPr lang="en-US" sz="2800" dirty="0"/>
-              <a:t>Cyclical learning rate = vary between two boundary values. Prevents you getting stuck on a plateau.</a:t>
+              <a:t>Cyclical learning rate = vary between two boundary values. Can prevent the optimizer from getting stuck on a narrow valley.</a:t>
             </a:r>
           </a:p>
         </p:txBody>
@@ -6208,8 +6428,8 @@
         </p:nvSpPr>
         <p:spPr>
           <a:xfrm>
-            <a:off x="693736" y="5817701"/>
-            <a:ext cx="5768975" cy="830997"/>
+            <a:off x="693736" y="5731631"/>
+            <a:ext cx="5768975" cy="1200329"/>
           </a:xfrm>
           <a:prstGeom prst="rect">
             <a:avLst/>
@@ -6225,7 +6445,15 @@
             <a:pPr algn="ctr"/>
             <a:r>
               <a:rPr lang="en-US" sz="2400" dirty="0"/>
-              <a:t>A comparison between learning rate schedules for learning the MNIST dataset</a:t>
+              <a:t>A comparison between learning rate schedules for learning the MNIST dataset from </a:t>
+            </a:r>
+            <a:r>
+              <a:rPr lang="en-US" sz="2400" dirty="0" err="1"/>
+              <a:t>Konar</a:t>
+            </a:r>
+            <a:r>
+              <a:rPr lang="en-US" sz="2400" dirty="0"/>
+              <a:t> et al. (2020)</a:t>
             </a:r>
           </a:p>
         </p:txBody>
@@ -6715,7 +6943,7 @@
           <a:p>
             <a:r>
               <a:rPr lang="en-US" dirty="0"/>
-              <a:t>Circular schedulers can prevent getting stuck on a plateau</a:t>
+              <a:t>Circular schedulers can prevent the optimizer getting stuck on a narrow valley</a:t>
             </a:r>
           </a:p>
           <a:p>
@@ -7305,9 +7533,16 @@
             <p:ph idx="1"/>
           </p:nvPr>
         </p:nvSpPr>
-        <p:spPr/>
-        <p:txBody>
-          <a:bodyPr/>
+        <p:spPr>
+          <a:xfrm>
+            <a:off x="838200" y="1825625"/>
+            <a:ext cx="10959790" cy="4351338"/>
+          </a:xfrm>
+        </p:spPr>
+        <p:txBody>
+          <a:bodyPr>
+            <a:normAutofit lnSpcReduction="10000"/>
+          </a:bodyPr>
           <a:lstStyle/>
           <a:p>
             <a:pPr marL="0" indent="-457200">
@@ -7368,15 +7603,15 @@
             </a:pPr>
             <a:r>
               <a:rPr lang="en-US" dirty="0"/>
-              <a:t>J. </a:t>
+              <a:t>S. </a:t>
             </a:r>
             <a:r>
               <a:rPr lang="en-US" dirty="0" err="1"/>
-              <a:t>Bjorck</a:t>
+              <a:t>Santukar</a:t>
             </a:r>
             <a:r>
               <a:rPr lang="en-US" dirty="0"/>
-              <a:t> et al. (2018) “Understanding Batch Normalization”</a:t>
+              <a:t> et al. (2018) “How does Batch Normalization Help Optimization?”</a:t>
             </a:r>
           </a:p>
           <a:p>
@@ -7392,6 +7627,26 @@
             </a:r>
             <a:r>
               <a:rPr lang="en-US" dirty="0" err="1"/>
+              <a:t>Bjorck</a:t>
+            </a:r>
+            <a:r>
+              <a:rPr lang="en-US" dirty="0"/>
+              <a:t> et al. (2018) “Understanding Batch Normalization”</a:t>
+            </a:r>
+          </a:p>
+          <a:p>
+            <a:pPr marL="0" indent="-457200">
+              <a:spcAft>
+                <a:spcPts val="1200"/>
+              </a:spcAft>
+              <a:buNone/>
+            </a:pPr>
+            <a:r>
+              <a:rPr lang="en-US" dirty="0"/>
+              <a:t>J. </a:t>
+            </a:r>
+            <a:r>
+              <a:rPr lang="en-US" dirty="0" err="1"/>
               <a:t>Konar</a:t>
             </a:r>
             <a:r>
@@ -7406,6 +7661,15 @@
               <a:rPr lang="en-US" dirty="0"/>
               <a:t> on Convolutional Neural Network”</a:t>
             </a:r>
+          </a:p>
+          <a:p>
+            <a:pPr marL="0" indent="-457200">
+              <a:spcAft>
+                <a:spcPts val="1200"/>
+              </a:spcAft>
+              <a:buNone/>
+            </a:pPr>
+            <a:endParaRPr lang="en-US" dirty="0"/>
           </a:p>
           <a:p>
             <a:pPr marL="0" indent="0">
@@ -7758,6 +8022,44 @@
           </a:p>
         </p:txBody>
       </p:sp>
+      <p:sp>
+        <p:nvSpPr>
+          <p:cNvPr id="3" name="TextBox 2">
+            <a:extLst>
+              <a:ext uri="{FF2B5EF4-FFF2-40B4-BE49-F238E27FC236}">
+                <a16:creationId xmlns:a16="http://schemas.microsoft.com/office/drawing/2014/main" id="{CA398EC6-982F-FA4A-BBB1-3DB1E11BAD98}"/>
+              </a:ext>
+            </a:extLst>
+          </p:cNvPr>
+          <p:cNvSpPr txBox="1"/>
+          <p:nvPr/>
+        </p:nvSpPr>
+        <p:spPr>
+          <a:xfrm>
+            <a:off x="4720447" y="6519446"/>
+            <a:ext cx="8610414" cy="338554"/>
+          </a:xfrm>
+          <a:prstGeom prst="rect">
+            <a:avLst/>
+          </a:prstGeom>
+          <a:noFill/>
+        </p:spPr>
+        <p:txBody>
+          <a:bodyPr wrap="square" rtlCol="0">
+            <a:spAutoFit/>
+          </a:bodyPr>
+          <a:lstStyle/>
+          <a:p>
+            <a:r>
+              <a:rPr lang="en-US" sz="1600" dirty="0">
+                <a:hlinkClick r:id="rId3"/>
+              </a:rPr>
+              <a:t>https://www.analyticsvidhya.com/blog/2021/03/introduction-to-batch-normalization/</a:t>
+            </a:r>
+            <a:endParaRPr lang="en-US" sz="1600" dirty="0"/>
+          </a:p>
+        </p:txBody>
+      </p:sp>
     </p:spTree>
     <p:extLst>
       <p:ext uri="{BB962C8B-B14F-4D97-AF65-F5344CB8AC3E}">
@@ -8332,6 +8634,49 @@
           </a:prstGeom>
         </p:spPr>
       </p:pic>
+      <p:sp>
+        <p:nvSpPr>
+          <p:cNvPr id="6" name="TextBox 5">
+            <a:extLst>
+              <a:ext uri="{FF2B5EF4-FFF2-40B4-BE49-F238E27FC236}">
+                <a16:creationId xmlns:a16="http://schemas.microsoft.com/office/drawing/2014/main" id="{C45AEDE3-1532-CD4E-8710-01640939D849}"/>
+              </a:ext>
+            </a:extLst>
+          </p:cNvPr>
+          <p:cNvSpPr txBox="1"/>
+          <p:nvPr/>
+        </p:nvSpPr>
+        <p:spPr>
+          <a:xfrm>
+            <a:off x="9595624" y="6488668"/>
+            <a:ext cx="2824976" cy="369332"/>
+          </a:xfrm>
+          <a:prstGeom prst="rect">
+            <a:avLst/>
+          </a:prstGeom>
+          <a:noFill/>
+        </p:spPr>
+        <p:txBody>
+          <a:bodyPr wrap="square" rtlCol="0">
+            <a:spAutoFit/>
+          </a:bodyPr>
+          <a:lstStyle/>
+          <a:p>
+            <a:r>
+              <a:rPr lang="en-US" dirty="0"/>
+              <a:t>Figure: </a:t>
+            </a:r>
+            <a:r>
+              <a:rPr lang="en-US" dirty="0" err="1"/>
+              <a:t>Bjorck</a:t>
+            </a:r>
+            <a:r>
+              <a:rPr lang="en-US" dirty="0"/>
+              <a:t> et al. (2018)</a:t>
+            </a:r>
+          </a:p>
+        </p:txBody>
+      </p:sp>
     </p:spTree>
     <p:extLst>
       <p:ext uri="{BB962C8B-B14F-4D97-AF65-F5344CB8AC3E}">
@@ -8518,7 +8863,7 @@
           </p:nvPr>
         </p:nvPicPr>
         <p:blipFill>
-          <a:blip r:embed="rId2"/>
+          <a:blip r:embed="rId3"/>
           <a:stretch>
             <a:fillRect/>
           </a:stretch>
@@ -8548,7 +8893,7 @@
           <p:nvPr/>
         </p:nvPicPr>
         <p:blipFill rotWithShape="1">
-          <a:blip r:embed="rId3"/>
+          <a:blip r:embed="rId4"/>
           <a:srcRect l="34422" t="40393" r="42096" b="41551"/>
           <a:stretch/>
         </p:blipFill>
@@ -8752,6 +9097,49 @@
           <a:p>
             <a:pPr algn="ctr"/>
             <a:endParaRPr lang="en-US"/>
+          </a:p>
+        </p:txBody>
+      </p:sp>
+      <p:sp>
+        <p:nvSpPr>
+          <p:cNvPr id="11" name="TextBox 10">
+            <a:extLst>
+              <a:ext uri="{FF2B5EF4-FFF2-40B4-BE49-F238E27FC236}">
+                <a16:creationId xmlns:a16="http://schemas.microsoft.com/office/drawing/2014/main" id="{D32BA35C-3A33-7C4F-AD4E-FA1FCA922F44}"/>
+              </a:ext>
+            </a:extLst>
+          </p:cNvPr>
+          <p:cNvSpPr txBox="1"/>
+          <p:nvPr/>
+        </p:nvSpPr>
+        <p:spPr>
+          <a:xfrm>
+            <a:off x="10665634" y="5888450"/>
+            <a:ext cx="1526366" cy="923330"/>
+          </a:xfrm>
+          <a:prstGeom prst="rect">
+            <a:avLst/>
+          </a:prstGeom>
+          <a:noFill/>
+        </p:spPr>
+        <p:txBody>
+          <a:bodyPr wrap="square" rtlCol="0">
+            <a:spAutoFit/>
+          </a:bodyPr>
+          <a:lstStyle/>
+          <a:p>
+            <a:r>
+              <a:rPr lang="en-US" dirty="0"/>
+              <a:t>Figure: </a:t>
+            </a:r>
+            <a:r>
+              <a:rPr lang="en-US" dirty="0" err="1"/>
+              <a:t>Santurkar</a:t>
+            </a:r>
+            <a:r>
+              <a:rPr lang="en-US" dirty="0"/>
+              <a:t> et al. (2018)</a:t>
+            </a:r>
           </a:p>
         </p:txBody>
       </p:sp>
@@ -9020,6 +9408,49 @@
             <a:r>
               <a:rPr lang="en-US" dirty="0"/>
               <a:t> </a:t>
+            </a:r>
+          </a:p>
+        </p:txBody>
+      </p:sp>
+      <p:sp>
+        <p:nvSpPr>
+          <p:cNvPr id="3" name="TextBox 2">
+            <a:extLst>
+              <a:ext uri="{FF2B5EF4-FFF2-40B4-BE49-F238E27FC236}">
+                <a16:creationId xmlns:a16="http://schemas.microsoft.com/office/drawing/2014/main" id="{A713D4CB-88C2-E445-937C-EA1D3C1A148A}"/>
+              </a:ext>
+            </a:extLst>
+          </p:cNvPr>
+          <p:cNvSpPr txBox="1"/>
+          <p:nvPr/>
+        </p:nvSpPr>
+        <p:spPr>
+          <a:xfrm>
+            <a:off x="9595624" y="6488668"/>
+            <a:ext cx="2824976" cy="369332"/>
+          </a:xfrm>
+          <a:prstGeom prst="rect">
+            <a:avLst/>
+          </a:prstGeom>
+          <a:noFill/>
+        </p:spPr>
+        <p:txBody>
+          <a:bodyPr wrap="square" rtlCol="0">
+            <a:spAutoFit/>
+          </a:bodyPr>
+          <a:lstStyle/>
+          <a:p>
+            <a:r>
+              <a:rPr lang="en-US" dirty="0"/>
+              <a:t>Figure: </a:t>
+            </a:r>
+            <a:r>
+              <a:rPr lang="en-US" dirty="0" err="1"/>
+              <a:t>Bjorck</a:t>
+            </a:r>
+            <a:r>
+              <a:rPr lang="en-US" dirty="0"/>
+              <a:t> et al. (2018)</a:t>
             </a:r>
           </a:p>
         </p:txBody>

</xml_diff>